<commit_message>
Update figure 3, component interactions for deleteExpense 1 command
</commit_message>
<xml_diff>
--- a/docs/diagrams/LogicComponentSequenceDiagram.pptx
+++ b/docs/diagrams/LogicComponentSequenceDiagram.pptx
@@ -208,7 +208,7 @@
           <a:p>
             <a:fld id="{F5CC4B3F-88C1-4FFA-B1B6-F41C21DC6924}" type="datetimeFigureOut">
               <a:rPr lang="en-US" smtClean="0"/>
-              <a:t>12/15/2018</a:t>
+              <a:t>4/11/2019</a:t>
             </a:fld>
             <a:endParaRPr lang="en-US"/>
           </a:p>
@@ -738,7 +738,7 @@
           <a:p>
             <a:fld id="{78C97017-6FC3-485B-9764-EAC9E56C1D49}" type="datetimeFigureOut">
               <a:rPr lang="en-US" smtClean="0"/>
-              <a:t>12/15/2018</a:t>
+              <a:t>4/11/2019</a:t>
             </a:fld>
             <a:endParaRPr lang="en-US"/>
           </a:p>
@@ -906,7 +906,7 @@
           <a:p>
             <a:fld id="{78C97017-6FC3-485B-9764-EAC9E56C1D49}" type="datetimeFigureOut">
               <a:rPr lang="en-US" smtClean="0"/>
-              <a:t>12/15/2018</a:t>
+              <a:t>4/11/2019</a:t>
             </a:fld>
             <a:endParaRPr lang="en-US"/>
           </a:p>
@@ -1084,7 +1084,7 @@
           <a:p>
             <a:fld id="{78C97017-6FC3-485B-9764-EAC9E56C1D49}" type="datetimeFigureOut">
               <a:rPr lang="en-US" smtClean="0"/>
-              <a:t>12/15/2018</a:t>
+              <a:t>4/11/2019</a:t>
             </a:fld>
             <a:endParaRPr lang="en-US"/>
           </a:p>
@@ -1252,7 +1252,7 @@
           <a:p>
             <a:fld id="{78C97017-6FC3-485B-9764-EAC9E56C1D49}" type="datetimeFigureOut">
               <a:rPr lang="en-US" smtClean="0"/>
-              <a:t>12/15/2018</a:t>
+              <a:t>4/11/2019</a:t>
             </a:fld>
             <a:endParaRPr lang="en-US"/>
           </a:p>
@@ -1497,7 +1497,7 @@
           <a:p>
             <a:fld id="{78C97017-6FC3-485B-9764-EAC9E56C1D49}" type="datetimeFigureOut">
               <a:rPr lang="en-US" smtClean="0"/>
-              <a:t>12/15/2018</a:t>
+              <a:t>4/11/2019</a:t>
             </a:fld>
             <a:endParaRPr lang="en-US"/>
           </a:p>
@@ -1782,7 +1782,7 @@
           <a:p>
             <a:fld id="{78C97017-6FC3-485B-9764-EAC9E56C1D49}" type="datetimeFigureOut">
               <a:rPr lang="en-US" smtClean="0"/>
-              <a:t>12/15/2018</a:t>
+              <a:t>4/11/2019</a:t>
             </a:fld>
             <a:endParaRPr lang="en-US"/>
           </a:p>
@@ -2201,7 +2201,7 @@
           <a:p>
             <a:fld id="{78C97017-6FC3-485B-9764-EAC9E56C1D49}" type="datetimeFigureOut">
               <a:rPr lang="en-US" smtClean="0"/>
-              <a:t>12/15/2018</a:t>
+              <a:t>4/11/2019</a:t>
             </a:fld>
             <a:endParaRPr lang="en-US"/>
           </a:p>
@@ -2318,7 +2318,7 @@
           <a:p>
             <a:fld id="{78C97017-6FC3-485B-9764-EAC9E56C1D49}" type="datetimeFigureOut">
               <a:rPr lang="en-US" smtClean="0"/>
-              <a:t>12/15/2018</a:t>
+              <a:t>4/11/2019</a:t>
             </a:fld>
             <a:endParaRPr lang="en-US"/>
           </a:p>
@@ -2413,7 +2413,7 @@
           <a:p>
             <a:fld id="{78C97017-6FC3-485B-9764-EAC9E56C1D49}" type="datetimeFigureOut">
               <a:rPr lang="en-US" smtClean="0"/>
-              <a:t>12/15/2018</a:t>
+              <a:t>4/11/2019</a:t>
             </a:fld>
             <a:endParaRPr lang="en-US"/>
           </a:p>
@@ -2688,7 +2688,7 @@
           <a:p>
             <a:fld id="{78C97017-6FC3-485B-9764-EAC9E56C1D49}" type="datetimeFigureOut">
               <a:rPr lang="en-US" smtClean="0"/>
-              <a:t>12/15/2018</a:t>
+              <a:t>4/11/2019</a:t>
             </a:fld>
             <a:endParaRPr lang="en-US"/>
           </a:p>
@@ -2940,7 +2940,7 @@
           <a:p>
             <a:fld id="{78C97017-6FC3-485B-9764-EAC9E56C1D49}" type="datetimeFigureOut">
               <a:rPr lang="en-US" smtClean="0"/>
-              <a:t>12/15/2018</a:t>
+              <a:t>4/11/2019</a:t>
             </a:fld>
             <a:endParaRPr lang="en-US"/>
           </a:p>
@@ -3151,7 +3151,7 @@
           <a:p>
             <a:fld id="{78C97017-6FC3-485B-9764-EAC9E56C1D49}" type="datetimeFigureOut">
               <a:rPr lang="en-US" smtClean="0"/>
-              <a:t>12/15/2018</a:t>
+              <a:t>4/11/2019</a:t>
             </a:fld>
             <a:endParaRPr lang="en-US"/>
           </a:p>
@@ -4376,8 +4376,8 @@
         </p:nvSpPr>
         <p:spPr>
           <a:xfrm>
-            <a:off x="4371378" y="3150453"/>
-            <a:ext cx="1228707" cy="215444"/>
+            <a:off x="4253702" y="3150453"/>
+            <a:ext cx="1346383" cy="215444"/>
           </a:xfrm>
           <a:prstGeom prst="rect">
             <a:avLst/>
@@ -4397,7 +4397,7 @@
                   <a:srgbClr val="7030A0"/>
                 </a:solidFill>
               </a:rPr>
-              <a:t>deletePerson</a:t>
+              <a:t>deleteExpense</a:t>
             </a:r>
             <a:r>
               <a:rPr lang="en-US" sz="1400" dirty="0">
@@ -4405,7 +4405,7 @@
                   <a:srgbClr val="7030A0"/>
                 </a:solidFill>
               </a:rPr>
-              <a:t>(p)</a:t>
+              <a:t>(e)</a:t>
             </a:r>
           </a:p>
         </p:txBody>
@@ -4763,7 +4763,7 @@
                   </a:schemeClr>
                 </a:solidFill>
               </a:rPr>
-              <a:t>saveAddressBook</a:t>
+              <a:t>saveEPiggy</a:t>
             </a:r>
             <a:r>
               <a:rPr lang="en-US" sz="1400" dirty="0">
@@ -4783,7 +4783,7 @@
                   </a:schemeClr>
                 </a:solidFill>
               </a:rPr>
-              <a:t>AddressBook</a:t>
+              <a:t>EPiggy</a:t>
             </a:r>
             <a:r>
               <a:rPr lang="en-US" sz="1400" dirty="0">

</xml_diff>